<commit_message>
revise toturial, release notes, README.md, fix a bug in main
</commit_message>
<xml_diff>
--- a/doc/figs/framework.pptx
+++ b/doc/figs/framework.pptx
@@ -197,7 +197,7 @@
           <a:p>
             <a:fld id="{9548E31E-5305-494F-A043-894735EFA7E4}" type="datetimeFigureOut">
               <a:rPr lang="en-US" smtClean="0"/>
-              <a:t>1/5/2014</a:t>
+              <a:t>3/1/2014</a:t>
             </a:fld>
             <a:endParaRPr lang="en-US"/>
           </a:p>
@@ -680,7 +680,7 @@
           <a:p>
             <a:fld id="{D28B9768-92D4-4488-84F0-145C3196ED37}" type="datetimeFigureOut">
               <a:rPr lang="en-US" smtClean="0"/>
-              <a:t>1/5/2014</a:t>
+              <a:t>3/1/2014</a:t>
             </a:fld>
             <a:endParaRPr lang="en-US"/>
           </a:p>
@@ -850,7 +850,7 @@
           <a:p>
             <a:fld id="{D28B9768-92D4-4488-84F0-145C3196ED37}" type="datetimeFigureOut">
               <a:rPr lang="en-US" smtClean="0"/>
-              <a:t>1/5/2014</a:t>
+              <a:t>3/1/2014</a:t>
             </a:fld>
             <a:endParaRPr lang="en-US"/>
           </a:p>
@@ -1030,7 +1030,7 @@
           <a:p>
             <a:fld id="{D28B9768-92D4-4488-84F0-145C3196ED37}" type="datetimeFigureOut">
               <a:rPr lang="en-US" smtClean="0"/>
-              <a:t>1/5/2014</a:t>
+              <a:t>3/1/2014</a:t>
             </a:fld>
             <a:endParaRPr lang="en-US"/>
           </a:p>
@@ -1200,7 +1200,7 @@
           <a:p>
             <a:fld id="{D28B9768-92D4-4488-84F0-145C3196ED37}" type="datetimeFigureOut">
               <a:rPr lang="en-US" smtClean="0"/>
-              <a:t>1/5/2014</a:t>
+              <a:t>3/1/2014</a:t>
             </a:fld>
             <a:endParaRPr lang="en-US"/>
           </a:p>
@@ -1446,7 +1446,7 @@
           <a:p>
             <a:fld id="{D28B9768-92D4-4488-84F0-145C3196ED37}" type="datetimeFigureOut">
               <a:rPr lang="en-US" smtClean="0"/>
-              <a:t>1/5/2014</a:t>
+              <a:t>3/1/2014</a:t>
             </a:fld>
             <a:endParaRPr lang="en-US"/>
           </a:p>
@@ -1678,7 +1678,7 @@
           <a:p>
             <a:fld id="{D28B9768-92D4-4488-84F0-145C3196ED37}" type="datetimeFigureOut">
               <a:rPr lang="en-US" smtClean="0"/>
-              <a:t>1/5/2014</a:t>
+              <a:t>3/1/2014</a:t>
             </a:fld>
             <a:endParaRPr lang="en-US"/>
           </a:p>
@@ -2045,7 +2045,7 @@
           <a:p>
             <a:fld id="{D28B9768-92D4-4488-84F0-145C3196ED37}" type="datetimeFigureOut">
               <a:rPr lang="en-US" smtClean="0"/>
-              <a:t>1/5/2014</a:t>
+              <a:t>3/1/2014</a:t>
             </a:fld>
             <a:endParaRPr lang="en-US"/>
           </a:p>
@@ -2163,7 +2163,7 @@
           <a:p>
             <a:fld id="{D28B9768-92D4-4488-84F0-145C3196ED37}" type="datetimeFigureOut">
               <a:rPr lang="en-US" smtClean="0"/>
-              <a:t>1/5/2014</a:t>
+              <a:t>3/1/2014</a:t>
             </a:fld>
             <a:endParaRPr lang="en-US"/>
           </a:p>
@@ -2258,7 +2258,7 @@
           <a:p>
             <a:fld id="{D28B9768-92D4-4488-84F0-145C3196ED37}" type="datetimeFigureOut">
               <a:rPr lang="en-US" smtClean="0"/>
-              <a:t>1/5/2014</a:t>
+              <a:t>3/1/2014</a:t>
             </a:fld>
             <a:endParaRPr lang="en-US"/>
           </a:p>
@@ -2535,7 +2535,7 @@
           <a:p>
             <a:fld id="{D28B9768-92D4-4488-84F0-145C3196ED37}" type="datetimeFigureOut">
               <a:rPr lang="en-US" smtClean="0"/>
-              <a:t>1/5/2014</a:t>
+              <a:t>3/1/2014</a:t>
             </a:fld>
             <a:endParaRPr lang="en-US"/>
           </a:p>
@@ -2792,7 +2792,7 @@
           <a:p>
             <a:fld id="{D28B9768-92D4-4488-84F0-145C3196ED37}" type="datetimeFigureOut">
               <a:rPr lang="en-US" smtClean="0"/>
-              <a:t>1/5/2014</a:t>
+              <a:t>3/1/2014</a:t>
             </a:fld>
             <a:endParaRPr lang="en-US"/>
           </a:p>
@@ -3005,7 +3005,7 @@
           <a:p>
             <a:fld id="{D28B9768-92D4-4488-84F0-145C3196ED37}" type="datetimeFigureOut">
               <a:rPr lang="en-US" smtClean="0"/>
-              <a:t>1/5/2014</a:t>
+              <a:t>3/1/2014</a:t>
             </a:fld>
             <a:endParaRPr lang="en-US"/>
           </a:p>
@@ -4026,10 +4026,10 @@
         </p:nvGrpSpPr>
         <p:grpSpPr>
           <a:xfrm>
-            <a:off x="13284207" y="7210537"/>
-            <a:ext cx="3436250" cy="1871328"/>
-            <a:chOff x="12849779" y="7019364"/>
-            <a:chExt cx="2011245" cy="1226028"/>
+            <a:off x="13284209" y="7210539"/>
+            <a:ext cx="3436250" cy="1872934"/>
+            <a:chOff x="12849780" y="7019364"/>
+            <a:chExt cx="2011245" cy="1227080"/>
           </a:xfrm>
         </p:grpSpPr>
         <p:sp>
@@ -4040,8 +4040,8 @@
           </p:nvSpPr>
           <p:spPr>
             <a:xfrm>
-              <a:off x="12849779" y="7025620"/>
-              <a:ext cx="959599" cy="565153"/>
+              <a:off x="12849780" y="7025620"/>
+              <a:ext cx="753949" cy="565153"/>
             </a:xfrm>
             <a:prstGeom prst="roundRect">
               <a:avLst/>
@@ -4070,7 +4070,7 @@
             <a:p>
               <a:pPr algn="ctr"/>
               <a:r>
-                <a:rPr lang="en-US" altLang="zh-CN" sz="1600" dirty="0" smtClean="0">
+                <a:rPr lang="en-US" altLang="zh-CN" sz="2000" dirty="0">
                   <a:solidFill>
                     <a:schemeClr val="tx1"/>
                   </a:solidFill>
@@ -4079,7 +4079,7 @@
                 </a:rPr>
                 <a:t>Hinge</a:t>
               </a:r>
-              <a:endParaRPr lang="zh-CN" altLang="en-US" sz="1600" dirty="0">
+              <a:endParaRPr lang="zh-CN" altLang="en-US" sz="2000" dirty="0">
                 <a:solidFill>
                   <a:schemeClr val="tx1"/>
                 </a:solidFill>
@@ -4097,8 +4097,8 @@
           </p:nvSpPr>
           <p:spPr>
             <a:xfrm>
-              <a:off x="13901425" y="7019364"/>
-              <a:ext cx="959599" cy="571410"/>
+              <a:off x="13730505" y="7019364"/>
+              <a:ext cx="1130520" cy="571410"/>
             </a:xfrm>
             <a:prstGeom prst="roundRect">
               <a:avLst/>
@@ -4127,7 +4127,7 @@
             <a:p>
               <a:pPr algn="ctr"/>
               <a:r>
-                <a:rPr lang="en-US" altLang="zh-CN" sz="1600" dirty="0" smtClean="0">
+                <a:rPr lang="en-US" altLang="zh-CN" sz="2000" dirty="0">
                   <a:solidFill>
                     <a:schemeClr val="tx1"/>
                   </a:solidFill>
@@ -4136,7 +4136,7 @@
                 </a:rPr>
                 <a:t>Logistic</a:t>
               </a:r>
-              <a:endParaRPr lang="zh-CN" altLang="en-US" sz="1600" dirty="0">
+              <a:endParaRPr lang="zh-CN" altLang="en-US" sz="2000" dirty="0">
                 <a:solidFill>
                   <a:schemeClr val="tx1"/>
                 </a:solidFill>
@@ -4154,8 +4154,8 @@
           </p:nvSpPr>
           <p:spPr>
             <a:xfrm>
-              <a:off x="12849779" y="7680192"/>
-              <a:ext cx="2011245" cy="565200"/>
+              <a:off x="13749417" y="7680192"/>
+              <a:ext cx="1111607" cy="565200"/>
             </a:xfrm>
             <a:prstGeom prst="roundRect">
               <a:avLst/>
@@ -4184,16 +4184,73 @@
             <a:p>
               <a:pPr algn="ctr"/>
               <a:r>
-                <a:rPr lang="en-US" altLang="zh-CN" sz="1600" dirty="0" err="1" smtClean="0">
+                <a:rPr lang="en-US" altLang="zh-CN" sz="2000" dirty="0" err="1" smtClean="0">
                   <a:solidFill>
                     <a:schemeClr val="tx1"/>
                   </a:solidFill>
                   <a:latin typeface="Arial" panose="020B0604020202020204" pitchFamily="34" charset="0"/>
                   <a:cs typeface="Arial" panose="020B0604020202020204" pitchFamily="34" charset="0"/>
                 </a:rPr>
-                <a:t>SquraedHinge</a:t>
+                <a:t>SquaredHinge</a:t>
               </a:r>
-              <a:endParaRPr lang="zh-CN" altLang="en-US" sz="1600" dirty="0">
+              <a:endParaRPr lang="zh-CN" altLang="en-US" sz="2000" dirty="0">
+                <a:solidFill>
+                  <a:schemeClr val="tx1"/>
+                </a:solidFill>
+                <a:latin typeface="Arial" panose="020B0604020202020204" pitchFamily="34" charset="0"/>
+                <a:cs typeface="Arial" panose="020B0604020202020204" pitchFamily="34" charset="0"/>
+              </a:endParaRPr>
+            </a:p>
+          </p:txBody>
+        </p:sp>
+        <p:sp>
+          <p:nvSpPr>
+            <p:cNvPr id="74" name="Rounded Rectangle 73"/>
+            <p:cNvSpPr/>
+            <p:nvPr/>
+          </p:nvSpPr>
+          <p:spPr>
+            <a:xfrm>
+              <a:off x="12849780" y="7681291"/>
+              <a:ext cx="753949" cy="565153"/>
+            </a:xfrm>
+            <a:prstGeom prst="roundRect">
+              <a:avLst/>
+            </a:prstGeom>
+            <a:solidFill>
+              <a:srgbClr val="00B0F0"/>
+            </a:solidFill>
+          </p:spPr>
+          <p:style>
+            <a:lnRef idx="1">
+              <a:schemeClr val="accent1"/>
+            </a:lnRef>
+            <a:fillRef idx="3">
+              <a:schemeClr val="accent1"/>
+            </a:fillRef>
+            <a:effectRef idx="2">
+              <a:schemeClr val="accent1"/>
+            </a:effectRef>
+            <a:fontRef idx="minor">
+              <a:schemeClr val="lt1"/>
+            </a:fontRef>
+          </p:style>
+          <p:txBody>
+            <a:bodyPr rtlCol="0" anchor="ctr"/>
+            <a:lstStyle/>
+            <a:p>
+              <a:pPr algn="ctr"/>
+              <a:r>
+                <a:rPr lang="en-US" altLang="zh-CN" sz="2000" dirty="0">
+                  <a:solidFill>
+                    <a:schemeClr val="tx1"/>
+                  </a:solidFill>
+                  <a:latin typeface="Arial" panose="020B0604020202020204" pitchFamily="34" charset="0"/>
+                  <a:cs typeface="Arial" panose="020B0604020202020204" pitchFamily="34" charset="0"/>
+                </a:rPr>
+                <a:t>Square</a:t>
+              </a:r>
+              <a:endParaRPr lang="zh-CN" altLang="en-US" sz="2000" dirty="0">
                 <a:solidFill>
                   <a:schemeClr val="tx1"/>
                 </a:solidFill>
@@ -5225,10 +5282,10 @@
           </p:nvGrpSpPr>
           <p:grpSpPr>
             <a:xfrm>
-              <a:off x="7514351" y="7490590"/>
-              <a:ext cx="4828751" cy="1889960"/>
-              <a:chOff x="7505457" y="6460468"/>
-              <a:chExt cx="4828751" cy="1889960"/>
+              <a:off x="7514351" y="7496846"/>
+              <a:ext cx="4841689" cy="1874720"/>
+              <a:chOff x="7505457" y="6466724"/>
+              <a:chExt cx="4841689" cy="1874720"/>
             </a:xfrm>
           </p:grpSpPr>
           <p:sp>
@@ -5295,8 +5352,8 @@
             </p:nvSpPr>
             <p:spPr>
               <a:xfrm>
-                <a:off x="8524734" y="7121295"/>
-                <a:ext cx="975713" cy="565200"/>
+                <a:off x="10035497" y="6474458"/>
+                <a:ext cx="1247361" cy="565200"/>
               </a:xfrm>
               <a:prstGeom prst="roundRect">
                 <a:avLst/>
@@ -5351,7 +5408,7 @@
             </p:nvSpPr>
             <p:spPr>
               <a:xfrm>
-                <a:off x="10937568" y="7121295"/>
+                <a:off x="8563785" y="7780351"/>
                 <a:ext cx="1393829" cy="561093"/>
               </a:xfrm>
               <a:prstGeom prst="roundRect">
@@ -5401,69 +5458,13 @@
           </p:sp>
           <p:sp>
             <p:nvSpPr>
-              <p:cNvPr id="72" name="Rounded Rectangle 71"/>
-              <p:cNvSpPr/>
-              <p:nvPr/>
-            </p:nvSpPr>
-            <p:spPr>
-              <a:xfrm>
-                <a:off x="8524735" y="7778971"/>
-                <a:ext cx="975713" cy="571457"/>
-              </a:xfrm>
-              <a:prstGeom prst="roundRect">
-                <a:avLst/>
-              </a:prstGeom>
-            </p:spPr>
-            <p:style>
-              <a:lnRef idx="2">
-                <a:schemeClr val="accent4">
-                  <a:shade val="50000"/>
-                </a:schemeClr>
-              </a:lnRef>
-              <a:fillRef idx="1">
-                <a:schemeClr val="accent4"/>
-              </a:fillRef>
-              <a:effectRef idx="0">
-                <a:schemeClr val="accent4"/>
-              </a:effectRef>
-              <a:fontRef idx="minor">
-                <a:schemeClr val="lt1"/>
-              </a:fontRef>
-            </p:style>
-            <p:txBody>
-              <a:bodyPr rtlCol="0" anchor="ctr"/>
-              <a:lstStyle/>
-              <a:p>
-                <a:pPr algn="ctr"/>
-                <a:r>
-                  <a:rPr lang="en-US" altLang="zh-CN" sz="1600" dirty="0" smtClean="0">
-                    <a:solidFill>
-                      <a:schemeClr val="tx1"/>
-                    </a:solidFill>
-                    <a:latin typeface="Arial" panose="020B0604020202020204" pitchFamily="34" charset="0"/>
-                    <a:cs typeface="Arial" panose="020B0604020202020204" pitchFamily="34" charset="0"/>
-                  </a:rPr>
-                  <a:t>SCW</a:t>
-                </a:r>
-                <a:endParaRPr lang="zh-CN" altLang="en-US" sz="1600" dirty="0">
-                  <a:solidFill>
-                    <a:schemeClr val="tx1"/>
-                  </a:solidFill>
-                  <a:latin typeface="Arial" panose="020B0604020202020204" pitchFamily="34" charset="0"/>
-                  <a:cs typeface="Arial" panose="020B0604020202020204" pitchFamily="34" charset="0"/>
-                </a:endParaRPr>
-              </a:p>
-            </p:txBody>
-          </p:sp>
-          <p:sp>
-            <p:nvSpPr>
               <p:cNvPr id="73" name="Rounded Rectangle 72"/>
               <p:cNvSpPr/>
               <p:nvPr/>
             </p:nvSpPr>
             <p:spPr>
               <a:xfrm>
-                <a:off x="9598429" y="6460468"/>
+                <a:off x="10041701" y="7122476"/>
                 <a:ext cx="1241157" cy="565152"/>
               </a:xfrm>
               <a:prstGeom prst="roundRect">
@@ -5631,7 +5632,7 @@
             </p:nvSpPr>
             <p:spPr>
               <a:xfrm>
-                <a:off x="10940379" y="6467780"/>
+                <a:off x="8566596" y="7126836"/>
                 <a:ext cx="1393829" cy="565200"/>
               </a:xfrm>
               <a:prstGeom prst="roundRect">
@@ -5687,8 +5688,8 @@
             </p:nvSpPr>
             <p:spPr>
               <a:xfrm>
-                <a:off x="9598429" y="7772163"/>
-                <a:ext cx="1244481" cy="565200"/>
+                <a:off x="11368871" y="7775248"/>
+                <a:ext cx="975713" cy="565200"/>
               </a:xfrm>
               <a:prstGeom prst="roundRect">
                 <a:avLst/>
@@ -5723,7 +5724,7 @@
                     <a:latin typeface="Arial" panose="020B0604020202020204" pitchFamily="34" charset="0"/>
                     <a:cs typeface="Arial" panose="020B0604020202020204" pitchFamily="34" charset="0"/>
                   </a:rPr>
-                  <a:t>AROW-FS</a:t>
+                  <a:t>SOFS</a:t>
                 </a:r>
                 <a:endParaRPr lang="zh-CN" altLang="en-US" sz="1600" dirty="0">
                   <a:solidFill>
@@ -5743,7 +5744,7 @@
             </p:nvSpPr>
             <p:spPr>
               <a:xfrm>
-                <a:off x="9598429" y="7121295"/>
+                <a:off x="10041702" y="7776244"/>
                 <a:ext cx="1241157" cy="561093"/>
               </a:xfrm>
               <a:prstGeom prst="roundRect">
@@ -5799,7 +5800,7 @@
             </p:nvSpPr>
             <p:spPr>
               <a:xfrm>
-                <a:off x="8527296" y="6463619"/>
+                <a:off x="11371433" y="6466724"/>
                 <a:ext cx="975713" cy="565200"/>
               </a:xfrm>
               <a:prstGeom prst="roundRect">
@@ -5835,7 +5836,7 @@
                     <a:latin typeface="Arial" panose="020B0604020202020204" pitchFamily="34" charset="0"/>
                     <a:cs typeface="Arial" panose="020B0604020202020204" pitchFamily="34" charset="0"/>
                   </a:rPr>
-                  <a:t>FOBOS</a:t>
+                  <a:t>PET</a:t>
                 </a:r>
                 <a:endParaRPr lang="zh-CN" altLang="en-US" sz="1600" dirty="0">
                   <a:solidFill>
@@ -5849,14 +5850,14 @@
           </p:sp>
           <p:sp>
             <p:nvSpPr>
-              <p:cNvPr id="279" name="Rounded Rectangle 278"/>
+              <p:cNvPr id="66" name="Rounded Rectangle 65"/>
               <p:cNvSpPr/>
               <p:nvPr/>
             </p:nvSpPr>
             <p:spPr>
               <a:xfrm>
-                <a:off x="10937567" y="7770703"/>
-                <a:ext cx="1393829" cy="561093"/>
+                <a:off x="11368871" y="7105275"/>
+                <a:ext cx="975713" cy="565200"/>
               </a:xfrm>
               <a:prstGeom prst="roundRect">
                 <a:avLst/>
@@ -5891,7 +5892,63 @@
                     <a:latin typeface="Arial" panose="020B0604020202020204" pitchFamily="34" charset="0"/>
                     <a:cs typeface="Arial" panose="020B0604020202020204" pitchFamily="34" charset="0"/>
                   </a:rPr>
-                  <a:t>SCW-RDA</a:t>
+                  <a:t>FOFS</a:t>
+                </a:r>
+                <a:endParaRPr lang="zh-CN" altLang="en-US" sz="1600" dirty="0">
+                  <a:solidFill>
+                    <a:schemeClr val="tx1"/>
+                  </a:solidFill>
+                  <a:latin typeface="Arial" panose="020B0604020202020204" pitchFamily="34" charset="0"/>
+                  <a:cs typeface="Arial" panose="020B0604020202020204" pitchFamily="34" charset="0"/>
+                </a:endParaRPr>
+              </a:p>
+            </p:txBody>
+          </p:sp>
+          <p:sp>
+            <p:nvSpPr>
+              <p:cNvPr id="67" name="Rounded Rectangle 66"/>
+              <p:cNvSpPr/>
+              <p:nvPr/>
+            </p:nvSpPr>
+            <p:spPr>
+              <a:xfrm>
+                <a:off x="8559705" y="6491514"/>
+                <a:ext cx="1393829" cy="565200"/>
+              </a:xfrm>
+              <a:prstGeom prst="roundRect">
+                <a:avLst/>
+              </a:prstGeom>
+            </p:spPr>
+            <p:style>
+              <a:lnRef idx="2">
+                <a:schemeClr val="accent4">
+                  <a:shade val="50000"/>
+                </a:schemeClr>
+              </a:lnRef>
+              <a:fillRef idx="1">
+                <a:schemeClr val="accent4"/>
+              </a:fillRef>
+              <a:effectRef idx="0">
+                <a:schemeClr val="accent4"/>
+              </a:effectRef>
+              <a:fontRef idx="minor">
+                <a:schemeClr val="lt1"/>
+              </a:fontRef>
+            </p:style>
+            <p:txBody>
+              <a:bodyPr rtlCol="0" anchor="ctr"/>
+              <a:lstStyle/>
+              <a:p>
+                <a:pPr algn="ctr"/>
+                <a:r>
+                  <a:rPr lang="en-US" altLang="zh-CN" sz="1600" dirty="0" smtClean="0">
+                    <a:solidFill>
+                      <a:schemeClr val="tx1"/>
+                    </a:solidFill>
+                    <a:latin typeface="Arial" panose="020B0604020202020204" pitchFamily="34" charset="0"/>
+                    <a:cs typeface="Arial" panose="020B0604020202020204" pitchFamily="34" charset="0"/>
+                  </a:rPr>
+                  <a:t>FOBOS</a:t>
                 </a:r>
                 <a:endParaRPr lang="zh-CN" altLang="en-US" sz="1600" dirty="0">
                   <a:solidFill>

</xml_diff>